<commit_message>
fix: poster headline centering
</commit_message>
<xml_diff>
--- a/poster/Poster-FIW_Abschluss_A2-Meta.pptx
+++ b/poster/Poster-FIW_Abschluss_A2-Meta.pptx
@@ -703,7 +703,7 @@
             </a:extLst>
           </p:cNvPr>
           <p:cNvSpPr>
-            <a:spLocks noChangeArrowheads="1" noTextEdit="1"/>
+            <a:spLocks noGrp="1" noRot="1" noChangeAspect="1" noChangeArrowheads="1" noTextEdit="1"/>
           </p:cNvSpPr>
           <p:nvPr>
             <p:ph type="sldImg" idx="2"/>
@@ -1185,7 +1185,7 @@
             </a:extLst>
           </p:cNvPr>
           <p:cNvSpPr>
-            <a:spLocks noChangeArrowheads="1" noTextEdit="1"/>
+            <a:spLocks noGrp="1" noRot="1" noChangeAspect="1" noChangeArrowheads="1" noTextEdit="1"/>
           </p:cNvSpPr>
           <p:nvPr>
             <p:ph type="sldImg"/>
@@ -3991,7 +3991,7 @@
               </a:lnSpc>
             </a:pPr>
             <a:r>
-              <a:rPr lang="en-US" altLang="de-DE" sz="4800"/>
+              <a:rPr lang="en-US" altLang="de-DE" sz="4800" dirty="0"/>
               <a:t>Security Evaluation of Multi-Factor Authentication in Comparison with the Web Authentication API</a:t>
             </a:r>
           </a:p>
@@ -4609,7 +4609,7 @@
         </p:nvSpPr>
         <p:spPr bwMode="auto">
           <a:xfrm>
-            <a:off x="1228725" y="1727200"/>
+            <a:off x="1139441" y="1727200"/>
             <a:ext cx="8496300" cy="701675"/>
           </a:xfrm>
           <a:prstGeom prst="rect">
@@ -4758,7 +4758,7 @@
               </a:spcBef>
             </a:pPr>
             <a:r>
-              <a:rPr lang="en-US" altLang="de-DE" sz="4000">
+              <a:rPr lang="en-US" altLang="de-DE" sz="4000" dirty="0">
                 <a:solidFill>
                   <a:schemeClr val="bg1"/>
                 </a:solidFill>

</xml_diff>